<commit_message>
Added: AES and Modern Cryptography
Added slides about AES and updated Modern Cryptography slide
Also added the thank you page
</commit_message>
<xml_diff>
--- a/Crypto.pptx
+++ b/Crypto.pptx
@@ -5,7 +5,7 @@
     <p:sldMasterId id="2147483648" r:id="rId1"/>
   </p:sldMasterIdLst>
   <p:notesMasterIdLst>
-    <p:notesMasterId r:id="rId40"/>
+    <p:notesMasterId r:id="rId42"/>
   </p:notesMasterIdLst>
   <p:sldIdLst>
     <p:sldId id="256" r:id="rId2"/>
@@ -45,7 +45,9 @@
     <p:sldId id="289" r:id="rId36"/>
     <p:sldId id="290" r:id="rId37"/>
     <p:sldId id="292" r:id="rId38"/>
-    <p:sldId id="291" r:id="rId39"/>
+    <p:sldId id="295" r:id="rId39"/>
+    <p:sldId id="291" r:id="rId40"/>
+    <p:sldId id="294" r:id="rId41"/>
   </p:sldIdLst>
   <p:sldSz cx="12192000" cy="6858000"/>
   <p:notesSz cx="6858000" cy="9144000"/>
@@ -682,11 +684,11 @@
         </c:dLbls>
         <c:gapWidth val="100"/>
         <c:overlap val="-24"/>
-        <c:axId val="265930616"/>
-        <c:axId val="265932184"/>
+        <c:axId val="262946752"/>
+        <c:axId val="262962040"/>
       </c:barChart>
       <c:catAx>
-        <c:axId val="265930616"/>
+        <c:axId val="262946752"/>
         <c:scaling>
           <c:orientation val="minMax"/>
         </c:scaling>
@@ -729,7 +731,7 @@
             <a:endParaRPr lang="en-US"/>
           </a:p>
         </c:txPr>
-        <c:crossAx val="265932184"/>
+        <c:crossAx val="262962040"/>
         <c:crosses val="autoZero"/>
         <c:auto val="1"/>
         <c:lblAlgn val="ctr"/>
@@ -737,7 +739,7 @@
         <c:noMultiLvlLbl val="0"/>
       </c:catAx>
       <c:valAx>
-        <c:axId val="265932184"/>
+        <c:axId val="262962040"/>
         <c:scaling>
           <c:orientation val="minMax"/>
         </c:scaling>
@@ -788,7 +790,7 @@
             <a:endParaRPr lang="en-US"/>
           </a:p>
         </c:txPr>
-        <c:crossAx val="265930616"/>
+        <c:crossAx val="262946752"/>
         <c:crosses val="autoZero"/>
         <c:crossBetween val="between"/>
       </c:valAx>
@@ -1386,11 +1388,11 @@
         </c:dLbls>
         <c:gapWidth val="100"/>
         <c:overlap val="-24"/>
-        <c:axId val="265929048"/>
-        <c:axId val="265929440"/>
+        <c:axId val="262959296"/>
+        <c:axId val="262960864"/>
       </c:barChart>
       <c:catAx>
-        <c:axId val="265929048"/>
+        <c:axId val="262959296"/>
         <c:scaling>
           <c:orientation val="minMax"/>
         </c:scaling>
@@ -1433,7 +1435,7 @@
             <a:endParaRPr lang="en-US"/>
           </a:p>
         </c:txPr>
-        <c:crossAx val="265929440"/>
+        <c:crossAx val="262960864"/>
         <c:crosses val="autoZero"/>
         <c:auto val="1"/>
         <c:lblAlgn val="ctr"/>
@@ -1441,7 +1443,7 @@
         <c:noMultiLvlLbl val="0"/>
       </c:catAx>
       <c:valAx>
-        <c:axId val="265929440"/>
+        <c:axId val="262960864"/>
         <c:scaling>
           <c:orientation val="minMax"/>
         </c:scaling>
@@ -1492,7 +1494,7 @@
             <a:endParaRPr lang="en-US"/>
           </a:p>
         </c:txPr>
-        <c:crossAx val="265929048"/>
+        <c:crossAx val="262959296"/>
         <c:crosses val="autoZero"/>
         <c:crossBetween val="between"/>
       </c:valAx>
@@ -1869,8 +1871,8 @@
           <c:showBubbleSize val="0"/>
         </c:dLbls>
         <c:gapWidth val="100"/>
-        <c:axId val="265940024"/>
-        <c:axId val="266046552"/>
+        <c:axId val="261736312"/>
+        <c:axId val="261734744"/>
       </c:barChart>
       <c:lineChart>
         <c:grouping val="standard"/>
@@ -2092,11 +2094,11 @@
         </c:dLbls>
         <c:marker val="1"/>
         <c:smooth val="0"/>
-        <c:axId val="265940024"/>
-        <c:axId val="266046552"/>
+        <c:axId val="261736312"/>
+        <c:axId val="261734744"/>
       </c:lineChart>
       <c:catAx>
-        <c:axId val="265940024"/>
+        <c:axId val="261736312"/>
         <c:scaling>
           <c:orientation val="minMax"/>
         </c:scaling>
@@ -2139,7 +2141,7 @@
             <a:endParaRPr lang="en-US"/>
           </a:p>
         </c:txPr>
-        <c:crossAx val="266046552"/>
+        <c:crossAx val="261734744"/>
         <c:crosses val="autoZero"/>
         <c:auto val="1"/>
         <c:lblAlgn val="ctr"/>
@@ -2147,7 +2149,7 @@
         <c:noMultiLvlLbl val="0"/>
       </c:catAx>
       <c:valAx>
-        <c:axId val="266046552"/>
+        <c:axId val="261734744"/>
         <c:scaling>
           <c:orientation val="minMax"/>
         </c:scaling>
@@ -2198,7 +2200,7 @@
             <a:endParaRPr lang="en-US"/>
           </a:p>
         </c:txPr>
-        <c:crossAx val="265940024"/>
+        <c:crossAx val="261736312"/>
         <c:crosses val="autoZero"/>
         <c:crossBetween val="between"/>
       </c:valAx>
@@ -30395,7 +30397,7 @@
           <a:p>
             <a:fld id="{F0D16127-FAC6-4D71-AAF0-647BC8CB00C7}" type="datetimeFigureOut">
               <a:rPr lang="en-US" smtClean="0"/>
-              <a:t>9/11/2017</a:t>
+              <a:t>9/16/2017</a:t>
             </a:fld>
             <a:endParaRPr lang="en-US"/>
           </a:p>
@@ -31305,7 +31307,7 @@
           <a:noFill/>
           <a:extLst>
             <a:ext uri="{909E8E84-426E-40dd-AFC4-6F175D3DCCD1}">
-              <a14:hiddenFill xmlns:a14="http://schemas.microsoft.com/office/drawing/2010/main" xmlns="">
+              <a14:hiddenFill xmlns="" xmlns:a14="http://schemas.microsoft.com/office/drawing/2010/main">
                 <a:solidFill>
                   <a:srgbClr val="FFFFFF"/>
                 </a:solidFill>
@@ -31365,7 +31367,7 @@
             </a:ln>
             <a:extLst>
               <a:ext uri="{91240B29-F687-4f45-9708-019B960494DF}">
-                <a14:hiddenLine xmlns:a14="http://schemas.microsoft.com/office/drawing/2010/main" xmlns="" w="9525">
+                <a14:hiddenLine xmlns="" xmlns:a14="http://schemas.microsoft.com/office/drawing/2010/main" w="9525">
                   <a:solidFill>
                     <a:srgbClr val="000000"/>
                   </a:solidFill>
@@ -31455,7 +31457,7 @@
             </a:ln>
             <a:extLst>
               <a:ext uri="{91240B29-F687-4f45-9708-019B960494DF}">
-                <a14:hiddenLine xmlns:a14="http://schemas.microsoft.com/office/drawing/2010/main" xmlns="" w="9525">
+                <a14:hiddenLine xmlns="" xmlns:a14="http://schemas.microsoft.com/office/drawing/2010/main" w="9525">
                   <a:solidFill>
                     <a:srgbClr val="000000"/>
                   </a:solidFill>
@@ -31545,7 +31547,7 @@
             </a:ln>
             <a:extLst>
               <a:ext uri="{91240B29-F687-4f45-9708-019B960494DF}">
-                <a14:hiddenLine xmlns:a14="http://schemas.microsoft.com/office/drawing/2010/main" xmlns="" w="9525">
+                <a14:hiddenLine xmlns="" xmlns:a14="http://schemas.microsoft.com/office/drawing/2010/main" w="9525">
                   <a:solidFill>
                     <a:srgbClr val="000000"/>
                   </a:solidFill>
@@ -31579,7 +31581,7 @@
             </a:ln>
             <a:extLst>
               <a:ext uri="{91240B29-F687-4f45-9708-019B960494DF}">
-                <a14:hiddenLine xmlns:a14="http://schemas.microsoft.com/office/drawing/2010/main" xmlns="" w="9525">
+                <a14:hiddenLine xmlns="" xmlns:a14="http://schemas.microsoft.com/office/drawing/2010/main" w="9525">
                   <a:solidFill>
                     <a:srgbClr val="000000"/>
                   </a:solidFill>
@@ -31669,7 +31671,7 @@
             </a:ln>
             <a:extLst>
               <a:ext uri="{91240B29-F687-4f45-9708-019B960494DF}">
-                <a14:hiddenLine xmlns:a14="http://schemas.microsoft.com/office/drawing/2010/main" xmlns="" w="9525">
+                <a14:hiddenLine xmlns="" xmlns:a14="http://schemas.microsoft.com/office/drawing/2010/main" w="9525">
                   <a:solidFill>
                     <a:srgbClr val="000000"/>
                   </a:solidFill>
@@ -31731,7 +31733,7 @@
             </a:ln>
             <a:extLst>
               <a:ext uri="{91240B29-F687-4f45-9708-019B960494DF}">
-                <a14:hiddenLine xmlns:a14="http://schemas.microsoft.com/office/drawing/2010/main" xmlns="" w="9525">
+                <a14:hiddenLine xmlns="" xmlns:a14="http://schemas.microsoft.com/office/drawing/2010/main" w="9525">
                   <a:solidFill>
                     <a:srgbClr val="000000"/>
                   </a:solidFill>
@@ -31793,7 +31795,7 @@
             </a:ln>
             <a:extLst>
               <a:ext uri="{91240B29-F687-4f45-9708-019B960494DF}">
-                <a14:hiddenLine xmlns:a14="http://schemas.microsoft.com/office/drawing/2010/main" xmlns="" w="9525">
+                <a14:hiddenLine xmlns="" xmlns:a14="http://schemas.microsoft.com/office/drawing/2010/main" w="9525">
                   <a:solidFill>
                     <a:srgbClr val="000000"/>
                   </a:solidFill>
@@ -31883,7 +31885,7 @@
             </a:ln>
             <a:extLst>
               <a:ext uri="{91240B29-F687-4f45-9708-019B960494DF}">
-                <a14:hiddenLine xmlns:a14="http://schemas.microsoft.com/office/drawing/2010/main" xmlns="" w="9525">
+                <a14:hiddenLine xmlns="" xmlns:a14="http://schemas.microsoft.com/office/drawing/2010/main" w="9525">
                   <a:solidFill>
                     <a:srgbClr val="000000"/>
                   </a:solidFill>
@@ -31945,7 +31947,7 @@
             </a:ln>
             <a:extLst>
               <a:ext uri="{91240B29-F687-4f45-9708-019B960494DF}">
-                <a14:hiddenLine xmlns:a14="http://schemas.microsoft.com/office/drawing/2010/main" xmlns="" w="9525">
+                <a14:hiddenLine xmlns="" xmlns:a14="http://schemas.microsoft.com/office/drawing/2010/main" w="9525">
                   <a:solidFill>
                     <a:srgbClr val="000000"/>
                   </a:solidFill>
@@ -32007,7 +32009,7 @@
             </a:ln>
             <a:extLst>
               <a:ext uri="{91240B29-F687-4f45-9708-019B960494DF}">
-                <a14:hiddenLine xmlns:a14="http://schemas.microsoft.com/office/drawing/2010/main" xmlns="" w="9525">
+                <a14:hiddenLine xmlns="" xmlns:a14="http://schemas.microsoft.com/office/drawing/2010/main" w="9525">
                   <a:solidFill>
                     <a:srgbClr val="000000"/>
                   </a:solidFill>
@@ -32097,7 +32099,7 @@
             </a:ln>
             <a:extLst>
               <a:ext uri="{91240B29-F687-4f45-9708-019B960494DF}">
-                <a14:hiddenLine xmlns:a14="http://schemas.microsoft.com/office/drawing/2010/main" xmlns="" w="9525">
+                <a14:hiddenLine xmlns="" xmlns:a14="http://schemas.microsoft.com/office/drawing/2010/main" w="9525">
                   <a:solidFill>
                     <a:srgbClr val="000000"/>
                   </a:solidFill>
@@ -32187,7 +32189,7 @@
             </a:ln>
             <a:extLst>
               <a:ext uri="{91240B29-F687-4f45-9708-019B960494DF}">
-                <a14:hiddenLine xmlns:a14="http://schemas.microsoft.com/office/drawing/2010/main" xmlns="" w="9525">
+                <a14:hiddenLine xmlns="" xmlns:a14="http://schemas.microsoft.com/office/drawing/2010/main" w="9525">
                   <a:solidFill>
                     <a:srgbClr val="000000"/>
                   </a:solidFill>
@@ -32249,7 +32251,7 @@
             </a:ln>
             <a:extLst>
               <a:ext uri="{91240B29-F687-4f45-9708-019B960494DF}">
-                <a14:hiddenLine xmlns:a14="http://schemas.microsoft.com/office/drawing/2010/main" xmlns="" w="9525">
+                <a14:hiddenLine xmlns="" xmlns:a14="http://schemas.microsoft.com/office/drawing/2010/main" w="9525">
                   <a:solidFill>
                     <a:srgbClr val="000000"/>
                   </a:solidFill>
@@ -32359,7 +32361,7 @@
             </a:ln>
             <a:extLst>
               <a:ext uri="{91240B29-F687-4f45-9708-019B960494DF}">
-                <a14:hiddenLine xmlns:a14="http://schemas.microsoft.com/office/drawing/2010/main" xmlns="" w="9525">
+                <a14:hiddenLine xmlns="" xmlns:a14="http://schemas.microsoft.com/office/drawing/2010/main" w="9525">
                   <a:solidFill>
                     <a:srgbClr val="000000"/>
                   </a:solidFill>
@@ -32421,7 +32423,7 @@
             </a:ln>
             <a:extLst>
               <a:ext uri="{91240B29-F687-4f45-9708-019B960494DF}">
-                <a14:hiddenLine xmlns:a14="http://schemas.microsoft.com/office/drawing/2010/main" xmlns="" w="9525">
+                <a14:hiddenLine xmlns="" xmlns:a14="http://schemas.microsoft.com/office/drawing/2010/main" w="9525">
                   <a:solidFill>
                     <a:srgbClr val="000000"/>
                   </a:solidFill>
@@ -32511,7 +32513,7 @@
             </a:ln>
             <a:extLst>
               <a:ext uri="{91240B29-F687-4f45-9708-019B960494DF}">
-                <a14:hiddenLine xmlns:a14="http://schemas.microsoft.com/office/drawing/2010/main" xmlns="" w="9525">
+                <a14:hiddenLine xmlns="" xmlns:a14="http://schemas.microsoft.com/office/drawing/2010/main" w="9525">
                   <a:solidFill>
                     <a:srgbClr val="000000"/>
                   </a:solidFill>
@@ -32601,7 +32603,7 @@
             </a:ln>
             <a:extLst>
               <a:ext uri="{91240B29-F687-4f45-9708-019B960494DF}">
-                <a14:hiddenLine xmlns:a14="http://schemas.microsoft.com/office/drawing/2010/main" xmlns="" w="9525">
+                <a14:hiddenLine xmlns="" xmlns:a14="http://schemas.microsoft.com/office/drawing/2010/main" w="9525">
                   <a:solidFill>
                     <a:srgbClr val="000000"/>
                   </a:solidFill>
@@ -32663,7 +32665,7 @@
             </a:ln>
             <a:extLst>
               <a:ext uri="{91240B29-F687-4f45-9708-019B960494DF}">
-                <a14:hiddenLine xmlns:a14="http://schemas.microsoft.com/office/drawing/2010/main" xmlns="" w="9525">
+                <a14:hiddenLine xmlns="" xmlns:a14="http://schemas.microsoft.com/office/drawing/2010/main" w="9525">
                   <a:solidFill>
                     <a:srgbClr val="000000"/>
                   </a:solidFill>
@@ -32753,7 +32755,7 @@
             </a:ln>
             <a:extLst>
               <a:ext uri="{91240B29-F687-4f45-9708-019B960494DF}">
-                <a14:hiddenLine xmlns:a14="http://schemas.microsoft.com/office/drawing/2010/main" xmlns="" w="9525">
+                <a14:hiddenLine xmlns="" xmlns:a14="http://schemas.microsoft.com/office/drawing/2010/main" w="9525">
                   <a:solidFill>
                     <a:srgbClr val="000000"/>
                   </a:solidFill>
@@ -32843,7 +32845,7 @@
             </a:ln>
             <a:extLst>
               <a:ext uri="{91240B29-F687-4f45-9708-019B960494DF}">
-                <a14:hiddenLine xmlns:a14="http://schemas.microsoft.com/office/drawing/2010/main" xmlns="" w="9525">
+                <a14:hiddenLine xmlns="" xmlns:a14="http://schemas.microsoft.com/office/drawing/2010/main" w="9525">
                   <a:solidFill>
                     <a:srgbClr val="000000"/>
                   </a:solidFill>
@@ -32899,7 +32901,7 @@
             </a:ln>
             <a:extLst>
               <a:ext uri="{91240B29-F687-4f45-9708-019B960494DF}">
-                <a14:hiddenLine xmlns:a14="http://schemas.microsoft.com/office/drawing/2010/main" xmlns="" w="9525">
+                <a14:hiddenLine xmlns="" xmlns:a14="http://schemas.microsoft.com/office/drawing/2010/main" w="9525">
                   <a:solidFill>
                     <a:srgbClr val="000000"/>
                   </a:solidFill>
@@ -32989,7 +32991,7 @@
             </a:ln>
             <a:extLst>
               <a:ext uri="{91240B29-F687-4f45-9708-019B960494DF}">
-                <a14:hiddenLine xmlns:a14="http://schemas.microsoft.com/office/drawing/2010/main" xmlns="" w="9525">
+                <a14:hiddenLine xmlns="" xmlns:a14="http://schemas.microsoft.com/office/drawing/2010/main" w="9525">
                   <a:solidFill>
                     <a:srgbClr val="000000"/>
                   </a:solidFill>
@@ -33045,7 +33047,7 @@
             </a:ln>
             <a:extLst>
               <a:ext uri="{91240B29-F687-4f45-9708-019B960494DF}">
-                <a14:hiddenLine xmlns:a14="http://schemas.microsoft.com/office/drawing/2010/main" xmlns="" w="9525">
+                <a14:hiddenLine xmlns="" xmlns:a14="http://schemas.microsoft.com/office/drawing/2010/main" w="9525">
                   <a:solidFill>
                     <a:srgbClr val="000000"/>
                   </a:solidFill>
@@ -33135,7 +33137,7 @@
             </a:ln>
             <a:extLst>
               <a:ext uri="{91240B29-F687-4f45-9708-019B960494DF}">
-                <a14:hiddenLine xmlns:a14="http://schemas.microsoft.com/office/drawing/2010/main" xmlns="" w="9525">
+                <a14:hiddenLine xmlns="" xmlns:a14="http://schemas.microsoft.com/office/drawing/2010/main" w="9525">
                   <a:solidFill>
                     <a:srgbClr val="000000"/>
                   </a:solidFill>
@@ -33203,7 +33205,7 @@
             </a:ln>
             <a:extLst>
               <a:ext uri="{91240B29-F687-4f45-9708-019B960494DF}">
-                <a14:hiddenLine xmlns:a14="http://schemas.microsoft.com/office/drawing/2010/main" xmlns="" w="9525">
+                <a14:hiddenLine xmlns="" xmlns:a14="http://schemas.microsoft.com/office/drawing/2010/main" w="9525">
                   <a:solidFill>
                     <a:srgbClr val="000000"/>
                   </a:solidFill>
@@ -33293,7 +33295,7 @@
             </a:ln>
             <a:extLst>
               <a:ext uri="{91240B29-F687-4f45-9708-019B960494DF}">
-                <a14:hiddenLine xmlns:a14="http://schemas.microsoft.com/office/drawing/2010/main" xmlns="" w="9525">
+                <a14:hiddenLine xmlns="" xmlns:a14="http://schemas.microsoft.com/office/drawing/2010/main" w="9525">
                   <a:solidFill>
                     <a:srgbClr val="000000"/>
                   </a:solidFill>
@@ -33361,7 +33363,7 @@
             </a:ln>
             <a:extLst>
               <a:ext uri="{91240B29-F687-4f45-9708-019B960494DF}">
-                <a14:hiddenLine xmlns:a14="http://schemas.microsoft.com/office/drawing/2010/main" xmlns="" w="9525">
+                <a14:hiddenLine xmlns="" xmlns:a14="http://schemas.microsoft.com/office/drawing/2010/main" w="9525">
                   <a:solidFill>
                     <a:srgbClr val="000000"/>
                   </a:solidFill>
@@ -33451,7 +33453,7 @@
             </a:ln>
             <a:extLst>
               <a:ext uri="{91240B29-F687-4f45-9708-019B960494DF}">
-                <a14:hiddenLine xmlns:a14="http://schemas.microsoft.com/office/drawing/2010/main" xmlns="" w="9525">
+                <a14:hiddenLine xmlns="" xmlns:a14="http://schemas.microsoft.com/office/drawing/2010/main" w="9525">
                   <a:solidFill>
                     <a:srgbClr val="000000"/>
                   </a:solidFill>
@@ -33485,7 +33487,7 @@
             </a:ln>
             <a:extLst>
               <a:ext uri="{91240B29-F687-4f45-9708-019B960494DF}">
-                <a14:hiddenLine xmlns:a14="http://schemas.microsoft.com/office/drawing/2010/main" xmlns="" w="9525">
+                <a14:hiddenLine xmlns="" xmlns:a14="http://schemas.microsoft.com/office/drawing/2010/main" w="9525">
                   <a:solidFill>
                     <a:srgbClr val="000000"/>
                   </a:solidFill>
@@ -33575,7 +33577,7 @@
             </a:ln>
             <a:extLst>
               <a:ext uri="{91240B29-F687-4f45-9708-019B960494DF}">
-                <a14:hiddenLine xmlns:a14="http://schemas.microsoft.com/office/drawing/2010/main" xmlns="" w="9525">
+                <a14:hiddenLine xmlns="" xmlns:a14="http://schemas.microsoft.com/office/drawing/2010/main" w="9525">
                   <a:solidFill>
                     <a:srgbClr val="000000"/>
                   </a:solidFill>
@@ -33637,7 +33639,7 @@
             </a:ln>
             <a:extLst>
               <a:ext uri="{91240B29-F687-4f45-9708-019B960494DF}">
-                <a14:hiddenLine xmlns:a14="http://schemas.microsoft.com/office/drawing/2010/main" xmlns="" w="9525">
+                <a14:hiddenLine xmlns="" xmlns:a14="http://schemas.microsoft.com/office/drawing/2010/main" w="9525">
                   <a:solidFill>
                     <a:srgbClr val="000000"/>
                   </a:solidFill>
@@ -33699,7 +33701,7 @@
             </a:ln>
             <a:extLst>
               <a:ext uri="{91240B29-F687-4f45-9708-019B960494DF}">
-                <a14:hiddenLine xmlns:a14="http://schemas.microsoft.com/office/drawing/2010/main" xmlns="" w="9525">
+                <a14:hiddenLine xmlns="" xmlns:a14="http://schemas.microsoft.com/office/drawing/2010/main" w="9525">
                   <a:solidFill>
                     <a:srgbClr val="000000"/>
                   </a:solidFill>
@@ -33789,7 +33791,7 @@
             </a:ln>
             <a:extLst>
               <a:ext uri="{91240B29-F687-4f45-9708-019B960494DF}">
-                <a14:hiddenLine xmlns:a14="http://schemas.microsoft.com/office/drawing/2010/main" xmlns="" w="9525">
+                <a14:hiddenLine xmlns="" xmlns:a14="http://schemas.microsoft.com/office/drawing/2010/main" w="9525">
                   <a:solidFill>
                     <a:srgbClr val="000000"/>
                   </a:solidFill>
@@ -33857,7 +33859,7 @@
             </a:ln>
             <a:extLst>
               <a:ext uri="{91240B29-F687-4f45-9708-019B960494DF}">
-                <a14:hiddenLine xmlns:a14="http://schemas.microsoft.com/office/drawing/2010/main" xmlns="" w="9525">
+                <a14:hiddenLine xmlns="" xmlns:a14="http://schemas.microsoft.com/office/drawing/2010/main" w="9525">
                   <a:solidFill>
                     <a:srgbClr val="000000"/>
                   </a:solidFill>
@@ -33919,7 +33921,7 @@
             </a:ln>
             <a:extLst>
               <a:ext uri="{91240B29-F687-4f45-9708-019B960494DF}">
-                <a14:hiddenLine xmlns:a14="http://schemas.microsoft.com/office/drawing/2010/main" xmlns="" w="9525">
+                <a14:hiddenLine xmlns="" xmlns:a14="http://schemas.microsoft.com/office/drawing/2010/main" w="9525">
                   <a:solidFill>
                     <a:srgbClr val="000000"/>
                   </a:solidFill>
@@ -34009,7 +34011,7 @@
             </a:ln>
             <a:extLst>
               <a:ext uri="{91240B29-F687-4f45-9708-019B960494DF}">
-                <a14:hiddenLine xmlns:a14="http://schemas.microsoft.com/office/drawing/2010/main" xmlns="" w="9525">
+                <a14:hiddenLine xmlns="" xmlns:a14="http://schemas.microsoft.com/office/drawing/2010/main" w="9525">
                   <a:solidFill>
                     <a:srgbClr val="000000"/>
                   </a:solidFill>
@@ -34071,7 +34073,7 @@
             </a:ln>
             <a:extLst>
               <a:ext uri="{91240B29-F687-4f45-9708-019B960494DF}">
-                <a14:hiddenLine xmlns:a14="http://schemas.microsoft.com/office/drawing/2010/main" xmlns="" w="9525">
+                <a14:hiddenLine xmlns="" xmlns:a14="http://schemas.microsoft.com/office/drawing/2010/main" w="9525">
                   <a:solidFill>
                     <a:srgbClr val="000000"/>
                   </a:solidFill>
@@ -34161,7 +34163,7 @@
             </a:ln>
             <a:extLst>
               <a:ext uri="{91240B29-F687-4f45-9708-019B960494DF}">
-                <a14:hiddenLine xmlns:a14="http://schemas.microsoft.com/office/drawing/2010/main" xmlns="" w="9525">
+                <a14:hiddenLine xmlns="" xmlns:a14="http://schemas.microsoft.com/office/drawing/2010/main" w="9525">
                   <a:solidFill>
                     <a:srgbClr val="000000"/>
                   </a:solidFill>
@@ -34223,7 +34225,7 @@
             </a:ln>
             <a:extLst>
               <a:ext uri="{91240B29-F687-4f45-9708-019B960494DF}">
-                <a14:hiddenLine xmlns:a14="http://schemas.microsoft.com/office/drawing/2010/main" xmlns="" w="9525">
+                <a14:hiddenLine xmlns="" xmlns:a14="http://schemas.microsoft.com/office/drawing/2010/main" w="9525">
                   <a:solidFill>
                     <a:srgbClr val="000000"/>
                   </a:solidFill>
@@ -34313,7 +34315,7 @@
             </a:ln>
             <a:extLst>
               <a:ext uri="{91240B29-F687-4f45-9708-019B960494DF}">
-                <a14:hiddenLine xmlns:a14="http://schemas.microsoft.com/office/drawing/2010/main" xmlns="" w="9525">
+                <a14:hiddenLine xmlns="" xmlns:a14="http://schemas.microsoft.com/office/drawing/2010/main" w="9525">
                   <a:solidFill>
                     <a:srgbClr val="000000"/>
                   </a:solidFill>
@@ -34347,7 +34349,7 @@
             </a:ln>
             <a:extLst>
               <a:ext uri="{91240B29-F687-4f45-9708-019B960494DF}">
-                <a14:hiddenLine xmlns:a14="http://schemas.microsoft.com/office/drawing/2010/main" xmlns="" w="9525">
+                <a14:hiddenLine xmlns="" xmlns:a14="http://schemas.microsoft.com/office/drawing/2010/main" w="9525">
                   <a:solidFill>
                     <a:srgbClr val="000000"/>
                   </a:solidFill>
@@ -34412,7 +34414,7 @@
             </a:ln>
             <a:extLst>
               <a:ext uri="{91240B29-F687-4f45-9708-019B960494DF}">
-                <a14:hiddenLine xmlns:a14="http://schemas.microsoft.com/office/drawing/2010/main" xmlns="" w="9525">
+                <a14:hiddenLine xmlns="" xmlns:a14="http://schemas.microsoft.com/office/drawing/2010/main" w="9525">
                   <a:solidFill>
                     <a:srgbClr val="000000"/>
                   </a:solidFill>
@@ -34502,7 +34504,7 @@
             </a:ln>
             <a:extLst>
               <a:ext uri="{91240B29-F687-4f45-9708-019B960494DF}">
-                <a14:hiddenLine xmlns:a14="http://schemas.microsoft.com/office/drawing/2010/main" xmlns="" w="9525">
+                <a14:hiddenLine xmlns="" xmlns:a14="http://schemas.microsoft.com/office/drawing/2010/main" w="9525">
                   <a:solidFill>
                     <a:srgbClr val="000000"/>
                   </a:solidFill>
@@ -34564,7 +34566,7 @@
             </a:ln>
             <a:extLst>
               <a:ext uri="{91240B29-F687-4f45-9708-019B960494DF}">
-                <a14:hiddenLine xmlns:a14="http://schemas.microsoft.com/office/drawing/2010/main" xmlns="" w="9525">
+                <a14:hiddenLine xmlns="" xmlns:a14="http://schemas.microsoft.com/office/drawing/2010/main" w="9525">
                   <a:solidFill>
                     <a:srgbClr val="000000"/>
                   </a:solidFill>
@@ -34654,7 +34656,7 @@
             </a:ln>
             <a:extLst>
               <a:ext uri="{91240B29-F687-4f45-9708-019B960494DF}">
-                <a14:hiddenLine xmlns:a14="http://schemas.microsoft.com/office/drawing/2010/main" xmlns="" w="9525">
+                <a14:hiddenLine xmlns="" xmlns:a14="http://schemas.microsoft.com/office/drawing/2010/main" w="9525">
                   <a:solidFill>
                     <a:srgbClr val="000000"/>
                   </a:solidFill>
@@ -34744,7 +34746,7 @@
             </a:ln>
             <a:extLst>
               <a:ext uri="{91240B29-F687-4f45-9708-019B960494DF}">
-                <a14:hiddenLine xmlns:a14="http://schemas.microsoft.com/office/drawing/2010/main" xmlns="" w="9525">
+                <a14:hiddenLine xmlns="" xmlns:a14="http://schemas.microsoft.com/office/drawing/2010/main" w="9525">
                   <a:solidFill>
                     <a:srgbClr val="000000"/>
                   </a:solidFill>
@@ -34809,7 +34811,7 @@
             </a:ln>
             <a:extLst>
               <a:ext uri="{91240B29-F687-4f45-9708-019B960494DF}">
-                <a14:hiddenLine xmlns:a14="http://schemas.microsoft.com/office/drawing/2010/main" xmlns="" w="9525">
+                <a14:hiddenLine xmlns="" xmlns:a14="http://schemas.microsoft.com/office/drawing/2010/main" w="9525">
                   <a:solidFill>
                     <a:srgbClr val="000000"/>
                   </a:solidFill>
@@ -34871,7 +34873,7 @@
             </a:ln>
             <a:extLst>
               <a:ext uri="{91240B29-F687-4f45-9708-019B960494DF}">
-                <a14:hiddenLine xmlns:a14="http://schemas.microsoft.com/office/drawing/2010/main" xmlns="" w="9525">
+                <a14:hiddenLine xmlns="" xmlns:a14="http://schemas.microsoft.com/office/drawing/2010/main" w="9525">
                   <a:solidFill>
                     <a:srgbClr val="000000"/>
                   </a:solidFill>
@@ -34961,7 +34963,7 @@
             </a:ln>
             <a:extLst>
               <a:ext uri="{91240B29-F687-4f45-9708-019B960494DF}">
-                <a14:hiddenLine xmlns:a14="http://schemas.microsoft.com/office/drawing/2010/main" xmlns="" w="9525">
+                <a14:hiddenLine xmlns="" xmlns:a14="http://schemas.microsoft.com/office/drawing/2010/main" w="9525">
                   <a:solidFill>
                     <a:srgbClr val="000000"/>
                   </a:solidFill>
@@ -35051,7 +35053,7 @@
             </a:ln>
             <a:extLst>
               <a:ext uri="{91240B29-F687-4f45-9708-019B960494DF}">
-                <a14:hiddenLine xmlns:a14="http://schemas.microsoft.com/office/drawing/2010/main" xmlns="" w="9525">
+                <a14:hiddenLine xmlns="" xmlns:a14="http://schemas.microsoft.com/office/drawing/2010/main" w="9525">
                   <a:solidFill>
                     <a:srgbClr val="000000"/>
                   </a:solidFill>
@@ -35113,7 +35115,7 @@
             </a:ln>
             <a:extLst>
               <a:ext uri="{91240B29-F687-4f45-9708-019B960494DF}">
-                <a14:hiddenLine xmlns:a14="http://schemas.microsoft.com/office/drawing/2010/main" xmlns="" w="9525">
+                <a14:hiddenLine xmlns="" xmlns:a14="http://schemas.microsoft.com/office/drawing/2010/main" w="9525">
                   <a:solidFill>
                     <a:srgbClr val="000000"/>
                   </a:solidFill>
@@ -35233,7 +35235,7 @@
             </a:ln>
             <a:extLst>
               <a:ext uri="{91240B29-F687-4f45-9708-019B960494DF}">
-                <a14:hiddenLine xmlns:a14="http://schemas.microsoft.com/office/drawing/2010/main" xmlns="" w="9525">
+                <a14:hiddenLine xmlns="" xmlns:a14="http://schemas.microsoft.com/office/drawing/2010/main" w="9525">
                   <a:solidFill>
                     <a:srgbClr val="000000"/>
                   </a:solidFill>
@@ -35301,7 +35303,7 @@
             </a:ln>
             <a:extLst>
               <a:ext uri="{91240B29-F687-4f45-9708-019B960494DF}">
-                <a14:hiddenLine xmlns:a14="http://schemas.microsoft.com/office/drawing/2010/main" xmlns="" w="9525">
+                <a14:hiddenLine xmlns="" xmlns:a14="http://schemas.microsoft.com/office/drawing/2010/main" w="9525">
                   <a:solidFill>
                     <a:srgbClr val="000000"/>
                   </a:solidFill>
@@ -35391,7 +35393,7 @@
             </a:ln>
             <a:extLst>
               <a:ext uri="{91240B29-F687-4f45-9708-019B960494DF}">
-                <a14:hiddenLine xmlns:a14="http://schemas.microsoft.com/office/drawing/2010/main" xmlns="" w="9525">
+                <a14:hiddenLine xmlns="" xmlns:a14="http://schemas.microsoft.com/office/drawing/2010/main" w="9525">
                   <a:solidFill>
                     <a:srgbClr val="000000"/>
                   </a:solidFill>
@@ -35531,7 +35533,7 @@
           <a:p>
             <a:fld id="{48A87A34-81AB-432B-8DAE-1953F412C126}" type="datetimeFigureOut">
               <a:rPr lang="en-US" smtClean="0"/>
-              <a:t>9/11/2017</a:t>
+              <a:t>9/16/2017</a:t>
             </a:fld>
             <a:endParaRPr lang="en-US" dirty="0"/>
           </a:p>
@@ -35793,7 +35795,7 @@
           <a:p>
             <a:fld id="{48A87A34-81AB-432B-8DAE-1953F412C126}" type="datetimeFigureOut">
               <a:rPr lang="en-US" smtClean="0"/>
-              <a:t>9/11/2017</a:t>
+              <a:t>9/16/2017</a:t>
             </a:fld>
             <a:endParaRPr lang="en-US" dirty="0"/>
           </a:p>
@@ -35984,7 +35986,7 @@
           <a:p>
             <a:fld id="{48A87A34-81AB-432B-8DAE-1953F412C126}" type="datetimeFigureOut">
               <a:rPr lang="en-US" smtClean="0"/>
-              <a:t>9/11/2017</a:t>
+              <a:t>9/16/2017</a:t>
             </a:fld>
             <a:endParaRPr lang="en-US" dirty="0"/>
           </a:p>
@@ -36242,7 +36244,7 @@
           <a:p>
             <a:fld id="{48A87A34-81AB-432B-8DAE-1953F412C126}" type="datetimeFigureOut">
               <a:rPr lang="en-US" smtClean="0"/>
-              <a:t>9/11/2017</a:t>
+              <a:t>9/16/2017</a:t>
             </a:fld>
             <a:endParaRPr lang="en-US" dirty="0"/>
           </a:p>
@@ -36671,7 +36673,7 @@
           <a:p>
             <a:fld id="{48A87A34-81AB-432B-8DAE-1953F412C126}" type="datetimeFigureOut">
               <a:rPr lang="en-US" smtClean="0"/>
-              <a:t>9/11/2017</a:t>
+              <a:t>9/16/2017</a:t>
             </a:fld>
             <a:endParaRPr lang="en-US" dirty="0"/>
           </a:p>
@@ -37212,7 +37214,7 @@
           <a:p>
             <a:fld id="{48A87A34-81AB-432B-8DAE-1953F412C126}" type="datetimeFigureOut">
               <a:rPr lang="en-US" smtClean="0"/>
-              <a:t>9/11/2017</a:t>
+              <a:t>9/16/2017</a:t>
             </a:fld>
             <a:endParaRPr lang="en-US" dirty="0"/>
           </a:p>
@@ -37927,7 +37929,7 @@
           <a:p>
             <a:fld id="{48A87A34-81AB-432B-8DAE-1953F412C126}" type="datetimeFigureOut">
               <a:rPr lang="en-US" smtClean="0"/>
-              <a:t>9/11/2017</a:t>
+              <a:t>9/16/2017</a:t>
             </a:fld>
             <a:endParaRPr lang="en-US" dirty="0"/>
           </a:p>
@@ -38092,7 +38094,7 @@
           <a:p>
             <a:fld id="{48A87A34-81AB-432B-8DAE-1953F412C126}" type="datetimeFigureOut">
               <a:rPr lang="en-US" smtClean="0"/>
-              <a:t>9/11/2017</a:t>
+              <a:t>9/16/2017</a:t>
             </a:fld>
             <a:endParaRPr lang="en-US" dirty="0"/>
           </a:p>
@@ -38267,7 +38269,7 @@
           <a:p>
             <a:fld id="{48A87A34-81AB-432B-8DAE-1953F412C126}" type="datetimeFigureOut">
               <a:rPr lang="en-US" smtClean="0"/>
-              <a:t>9/11/2017</a:t>
+              <a:t>9/16/2017</a:t>
             </a:fld>
             <a:endParaRPr lang="en-US" dirty="0"/>
           </a:p>
@@ -38432,7 +38434,7 @@
           <a:p>
             <a:fld id="{48A87A34-81AB-432B-8DAE-1953F412C126}" type="datetimeFigureOut">
               <a:rPr lang="en-US" smtClean="0"/>
-              <a:t>9/11/2017</a:t>
+              <a:t>9/16/2017</a:t>
             </a:fld>
             <a:endParaRPr lang="en-US" dirty="0"/>
           </a:p>
@@ -38677,7 +38679,7 @@
           <a:p>
             <a:fld id="{48A87A34-81AB-432B-8DAE-1953F412C126}" type="datetimeFigureOut">
               <a:rPr lang="en-US" smtClean="0"/>
-              <a:t>9/11/2017</a:t>
+              <a:t>9/16/2017</a:t>
             </a:fld>
             <a:endParaRPr lang="en-US" dirty="0"/>
           </a:p>
@@ -38904,7 +38906,7 @@
           <a:p>
             <a:fld id="{48A87A34-81AB-432B-8DAE-1953F412C126}" type="datetimeFigureOut">
               <a:rPr lang="en-US" smtClean="0"/>
-              <a:t>9/11/2017</a:t>
+              <a:t>9/16/2017</a:t>
             </a:fld>
             <a:endParaRPr lang="en-US" dirty="0"/>
           </a:p>
@@ -39280,7 +39282,7 @@
           <a:p>
             <a:fld id="{48A87A34-81AB-432B-8DAE-1953F412C126}" type="datetimeFigureOut">
               <a:rPr lang="en-US" smtClean="0"/>
-              <a:t>9/11/2017</a:t>
+              <a:t>9/16/2017</a:t>
             </a:fld>
             <a:endParaRPr lang="en-US" dirty="0"/>
           </a:p>
@@ -39393,7 +39395,7 @@
           <a:p>
             <a:fld id="{48A87A34-81AB-432B-8DAE-1953F412C126}" type="datetimeFigureOut">
               <a:rPr lang="en-US" smtClean="0"/>
-              <a:t>9/11/2017</a:t>
+              <a:t>9/16/2017</a:t>
             </a:fld>
             <a:endParaRPr lang="en-US" dirty="0"/>
           </a:p>
@@ -39483,7 +39485,7 @@
           <a:p>
             <a:fld id="{48A87A34-81AB-432B-8DAE-1953F412C126}" type="datetimeFigureOut">
               <a:rPr lang="en-US" smtClean="0"/>
-              <a:t>9/11/2017</a:t>
+              <a:t>9/16/2017</a:t>
             </a:fld>
             <a:endParaRPr lang="en-US" dirty="0"/>
           </a:p>
@@ -39727,7 +39729,7 @@
           <a:p>
             <a:fld id="{48A87A34-81AB-432B-8DAE-1953F412C126}" type="datetimeFigureOut">
               <a:rPr lang="en-US" smtClean="0"/>
-              <a:t>9/11/2017</a:t>
+              <a:t>9/16/2017</a:t>
             </a:fld>
             <a:endParaRPr lang="en-US" dirty="0"/>
           </a:p>
@@ -40002,7 +40004,7 @@
           <a:p>
             <a:fld id="{48A87A34-81AB-432B-8DAE-1953F412C126}" type="datetimeFigureOut">
               <a:rPr lang="en-US" smtClean="0"/>
-              <a:t>9/11/2017</a:t>
+              <a:t>9/16/2017</a:t>
             </a:fld>
             <a:endParaRPr lang="en-US" dirty="0"/>
           </a:p>
@@ -40113,7 +40115,7 @@
           <a:noFill/>
           <a:extLst>
             <a:ext uri="{909E8E84-426E-40dd-AFC4-6F175D3DCCD1}">
-              <a14:hiddenFill xmlns:a14="http://schemas.microsoft.com/office/drawing/2010/main" xmlns="">
+              <a14:hiddenFill xmlns="" xmlns:a14="http://schemas.microsoft.com/office/drawing/2010/main">
                 <a:solidFill>
                   <a:srgbClr val="FFFFFF"/>
                 </a:solidFill>
@@ -40187,7 +40189,7 @@
               </a:ln>
               <a:extLst>
                 <a:ext uri="{91240B29-F687-4f45-9708-019B960494DF}">
-                  <a14:hiddenLine xmlns:a14="http://schemas.microsoft.com/office/drawing/2010/main" xmlns="" w="9525">
+                  <a14:hiddenLine xmlns="" xmlns:a14="http://schemas.microsoft.com/office/drawing/2010/main" w="9525">
                     <a:solidFill>
                       <a:srgbClr val="000000"/>
                     </a:solidFill>
@@ -40277,7 +40279,7 @@
               </a:ln>
               <a:extLst>
                 <a:ext uri="{91240B29-F687-4f45-9708-019B960494DF}">
-                  <a14:hiddenLine xmlns:a14="http://schemas.microsoft.com/office/drawing/2010/main" xmlns="" w="9525">
+                  <a14:hiddenLine xmlns="" xmlns:a14="http://schemas.microsoft.com/office/drawing/2010/main" w="9525">
                     <a:solidFill>
                       <a:srgbClr val="000000"/>
                     </a:solidFill>
@@ -40367,7 +40369,7 @@
               </a:ln>
               <a:extLst>
                 <a:ext uri="{91240B29-F687-4f45-9708-019B960494DF}">
-                  <a14:hiddenLine xmlns:a14="http://schemas.microsoft.com/office/drawing/2010/main" xmlns="" w="9525">
+                  <a14:hiddenLine xmlns="" xmlns:a14="http://schemas.microsoft.com/office/drawing/2010/main" w="9525">
                     <a:solidFill>
                       <a:srgbClr val="000000"/>
                     </a:solidFill>
@@ -40429,7 +40431,7 @@
               </a:ln>
               <a:extLst>
                 <a:ext uri="{91240B29-F687-4f45-9708-019B960494DF}">
-                  <a14:hiddenLine xmlns:a14="http://schemas.microsoft.com/office/drawing/2010/main" xmlns="" w="9525">
+                  <a14:hiddenLine xmlns="" xmlns:a14="http://schemas.microsoft.com/office/drawing/2010/main" w="9525">
                     <a:solidFill>
                       <a:srgbClr val="000000"/>
                     </a:solidFill>
@@ -40519,7 +40521,7 @@
               </a:ln>
               <a:extLst>
                 <a:ext uri="{91240B29-F687-4f45-9708-019B960494DF}">
-                  <a14:hiddenLine xmlns:a14="http://schemas.microsoft.com/office/drawing/2010/main" xmlns="" w="9525">
+                  <a14:hiddenLine xmlns="" xmlns:a14="http://schemas.microsoft.com/office/drawing/2010/main" w="9525">
                     <a:solidFill>
                       <a:srgbClr val="000000"/>
                     </a:solidFill>
@@ -40581,7 +40583,7 @@
               </a:ln>
               <a:extLst>
                 <a:ext uri="{91240B29-F687-4f45-9708-019B960494DF}">
-                  <a14:hiddenLine xmlns:a14="http://schemas.microsoft.com/office/drawing/2010/main" xmlns="" w="9525">
+                  <a14:hiddenLine xmlns="" xmlns:a14="http://schemas.microsoft.com/office/drawing/2010/main" w="9525">
                     <a:solidFill>
                       <a:srgbClr val="000000"/>
                     </a:solidFill>
@@ -40643,7 +40645,7 @@
               </a:ln>
               <a:extLst>
                 <a:ext uri="{91240B29-F687-4f45-9708-019B960494DF}">
-                  <a14:hiddenLine xmlns:a14="http://schemas.microsoft.com/office/drawing/2010/main" xmlns="" w="9525">
+                  <a14:hiddenLine xmlns="" xmlns:a14="http://schemas.microsoft.com/office/drawing/2010/main" w="9525">
                     <a:solidFill>
                       <a:srgbClr val="000000"/>
                     </a:solidFill>
@@ -40733,7 +40735,7 @@
               </a:ln>
               <a:extLst>
                 <a:ext uri="{91240B29-F687-4f45-9708-019B960494DF}">
-                  <a14:hiddenLine xmlns:a14="http://schemas.microsoft.com/office/drawing/2010/main" xmlns="" w="9525">
+                  <a14:hiddenLine xmlns="" xmlns:a14="http://schemas.microsoft.com/office/drawing/2010/main" w="9525">
                     <a:solidFill>
                       <a:srgbClr val="000000"/>
                     </a:solidFill>
@@ -40823,7 +40825,7 @@
               </a:ln>
               <a:extLst>
                 <a:ext uri="{91240B29-F687-4f45-9708-019B960494DF}">
-                  <a14:hiddenLine xmlns:a14="http://schemas.microsoft.com/office/drawing/2010/main" xmlns="" w="9525">
+                  <a14:hiddenLine xmlns="" xmlns:a14="http://schemas.microsoft.com/office/drawing/2010/main" w="9525">
                     <a:solidFill>
                       <a:srgbClr val="000000"/>
                     </a:solidFill>
@@ -40885,7 +40887,7 @@
               </a:ln>
               <a:extLst>
                 <a:ext uri="{91240B29-F687-4f45-9708-019B960494DF}">
-                  <a14:hiddenLine xmlns:a14="http://schemas.microsoft.com/office/drawing/2010/main" xmlns="" w="9525">
+                  <a14:hiddenLine xmlns="" xmlns:a14="http://schemas.microsoft.com/office/drawing/2010/main" w="9525">
                     <a:solidFill>
                       <a:srgbClr val="000000"/>
                     </a:solidFill>
@@ -40995,7 +40997,7 @@
               </a:ln>
               <a:extLst>
                 <a:ext uri="{91240B29-F687-4f45-9708-019B960494DF}">
-                  <a14:hiddenLine xmlns:a14="http://schemas.microsoft.com/office/drawing/2010/main" xmlns="" w="9525">
+                  <a14:hiddenLine xmlns="" xmlns:a14="http://schemas.microsoft.com/office/drawing/2010/main" w="9525">
                     <a:solidFill>
                       <a:srgbClr val="000000"/>
                     </a:solidFill>
@@ -41079,7 +41081,7 @@
               </a:ln>
               <a:extLst>
                 <a:ext uri="{91240B29-F687-4f45-9708-019B960494DF}">
-                  <a14:hiddenLine xmlns:a14="http://schemas.microsoft.com/office/drawing/2010/main" xmlns="" w="9525">
+                  <a14:hiddenLine xmlns="" xmlns:a14="http://schemas.microsoft.com/office/drawing/2010/main" w="9525">
                     <a:solidFill>
                       <a:srgbClr val="000000"/>
                     </a:solidFill>
@@ -41141,7 +41143,7 @@
               </a:ln>
               <a:extLst>
                 <a:ext uri="{91240B29-F687-4f45-9708-019B960494DF}">
-                  <a14:hiddenLine xmlns:a14="http://schemas.microsoft.com/office/drawing/2010/main" xmlns="" w="9525">
+                  <a14:hiddenLine xmlns="" xmlns:a14="http://schemas.microsoft.com/office/drawing/2010/main" w="9525">
                     <a:solidFill>
                       <a:srgbClr val="000000"/>
                     </a:solidFill>
@@ -41203,7 +41205,7 @@
               </a:ln>
               <a:extLst>
                 <a:ext uri="{91240B29-F687-4f45-9708-019B960494DF}">
-                  <a14:hiddenLine xmlns:a14="http://schemas.microsoft.com/office/drawing/2010/main" xmlns="" w="9525">
+                  <a14:hiddenLine xmlns="" xmlns:a14="http://schemas.microsoft.com/office/drawing/2010/main" w="9525">
                     <a:solidFill>
                       <a:srgbClr val="000000"/>
                     </a:solidFill>
@@ -41293,7 +41295,7 @@
               </a:ln>
               <a:extLst>
                 <a:ext uri="{91240B29-F687-4f45-9708-019B960494DF}">
-                  <a14:hiddenLine xmlns:a14="http://schemas.microsoft.com/office/drawing/2010/main" xmlns="" w="9525">
+                  <a14:hiddenLine xmlns="" xmlns:a14="http://schemas.microsoft.com/office/drawing/2010/main" w="9525">
                     <a:solidFill>
                       <a:srgbClr val="000000"/>
                     </a:solidFill>
@@ -41327,7 +41329,7 @@
               </a:ln>
               <a:extLst>
                 <a:ext uri="{91240B29-F687-4f45-9708-019B960494DF}">
-                  <a14:hiddenLine xmlns:a14="http://schemas.microsoft.com/office/drawing/2010/main" xmlns="" w="9525">
+                  <a14:hiddenLine xmlns="" xmlns:a14="http://schemas.microsoft.com/office/drawing/2010/main" w="9525">
                     <a:solidFill>
                       <a:srgbClr val="000000"/>
                     </a:solidFill>
@@ -41392,7 +41394,7 @@
               </a:ln>
               <a:extLst>
                 <a:ext uri="{91240B29-F687-4f45-9708-019B960494DF}">
-                  <a14:hiddenLine xmlns:a14="http://schemas.microsoft.com/office/drawing/2010/main" xmlns="" w="9525">
+                  <a14:hiddenLine xmlns="" xmlns:a14="http://schemas.microsoft.com/office/drawing/2010/main" w="9525">
                     <a:solidFill>
                       <a:srgbClr val="000000"/>
                     </a:solidFill>
@@ -41482,7 +41484,7 @@
               </a:ln>
               <a:extLst>
                 <a:ext uri="{91240B29-F687-4f45-9708-019B960494DF}">
-                  <a14:hiddenLine xmlns:a14="http://schemas.microsoft.com/office/drawing/2010/main" xmlns="" w="9525">
+                  <a14:hiddenLine xmlns="" xmlns:a14="http://schemas.microsoft.com/office/drawing/2010/main" w="9525">
                     <a:solidFill>
                       <a:srgbClr val="000000"/>
                     </a:solidFill>
@@ -41544,7 +41546,7 @@
               </a:ln>
               <a:extLst>
                 <a:ext uri="{91240B29-F687-4f45-9708-019B960494DF}">
-                  <a14:hiddenLine xmlns:a14="http://schemas.microsoft.com/office/drawing/2010/main" xmlns="" w="9525">
+                  <a14:hiddenLine xmlns="" xmlns:a14="http://schemas.microsoft.com/office/drawing/2010/main" w="9525">
                     <a:solidFill>
                       <a:srgbClr val="000000"/>
                     </a:solidFill>
@@ -41634,7 +41636,7 @@
               </a:ln>
               <a:extLst>
                 <a:ext uri="{91240B29-F687-4f45-9708-019B960494DF}">
-                  <a14:hiddenLine xmlns:a14="http://schemas.microsoft.com/office/drawing/2010/main" xmlns="" w="9525">
+                  <a14:hiddenLine xmlns="" xmlns:a14="http://schemas.microsoft.com/office/drawing/2010/main" w="9525">
                     <a:solidFill>
                       <a:srgbClr val="000000"/>
                     </a:solidFill>
@@ -41699,7 +41701,7 @@
               </a:ln>
               <a:extLst>
                 <a:ext uri="{91240B29-F687-4f45-9708-019B960494DF}">
-                  <a14:hiddenLine xmlns:a14="http://schemas.microsoft.com/office/drawing/2010/main" xmlns="" w="9525">
+                  <a14:hiddenLine xmlns="" xmlns:a14="http://schemas.microsoft.com/office/drawing/2010/main" w="9525">
                     <a:solidFill>
                       <a:srgbClr val="000000"/>
                     </a:solidFill>
@@ -41761,7 +41763,7 @@
               </a:ln>
               <a:extLst>
                 <a:ext uri="{91240B29-F687-4f45-9708-019B960494DF}">
-                  <a14:hiddenLine xmlns:a14="http://schemas.microsoft.com/office/drawing/2010/main" xmlns="" w="9525">
+                  <a14:hiddenLine xmlns="" xmlns:a14="http://schemas.microsoft.com/office/drawing/2010/main" w="9525">
                     <a:solidFill>
                       <a:srgbClr val="000000"/>
                     </a:solidFill>
@@ -41851,7 +41853,7 @@
               </a:ln>
               <a:extLst>
                 <a:ext uri="{91240B29-F687-4f45-9708-019B960494DF}">
-                  <a14:hiddenLine xmlns:a14="http://schemas.microsoft.com/office/drawing/2010/main" xmlns="" w="9525">
+                  <a14:hiddenLine xmlns="" xmlns:a14="http://schemas.microsoft.com/office/drawing/2010/main" w="9525">
                     <a:solidFill>
                       <a:srgbClr val="000000"/>
                     </a:solidFill>
@@ -41941,7 +41943,7 @@
               </a:ln>
               <a:extLst>
                 <a:ext uri="{91240B29-F687-4f45-9708-019B960494DF}">
-                  <a14:hiddenLine xmlns:a14="http://schemas.microsoft.com/office/drawing/2010/main" xmlns="" w="9525">
+                  <a14:hiddenLine xmlns="" xmlns:a14="http://schemas.microsoft.com/office/drawing/2010/main" w="9525">
                     <a:solidFill>
                       <a:srgbClr val="000000"/>
                     </a:solidFill>
@@ -42006,7 +42008,7 @@
               </a:ln>
               <a:extLst>
                 <a:ext uri="{91240B29-F687-4f45-9708-019B960494DF}">
-                  <a14:hiddenLine xmlns:a14="http://schemas.microsoft.com/office/drawing/2010/main" xmlns="" w="9525">
+                  <a14:hiddenLine xmlns="" xmlns:a14="http://schemas.microsoft.com/office/drawing/2010/main" w="9525">
                     <a:solidFill>
                       <a:srgbClr val="000000"/>
                     </a:solidFill>
@@ -42126,7 +42128,7 @@
               </a:ln>
               <a:extLst>
                 <a:ext uri="{91240B29-F687-4f45-9708-019B960494DF}">
-                  <a14:hiddenLine xmlns:a14="http://schemas.microsoft.com/office/drawing/2010/main" xmlns="" w="9525">
+                  <a14:hiddenLine xmlns="" xmlns:a14="http://schemas.microsoft.com/office/drawing/2010/main" w="9525">
                     <a:solidFill>
                       <a:srgbClr val="000000"/>
                     </a:solidFill>
@@ -42224,7 +42226,7 @@
               </a:ln>
               <a:extLst>
                 <a:ext uri="{91240B29-F687-4f45-9708-019B960494DF}">
-                  <a14:hiddenLine xmlns:a14="http://schemas.microsoft.com/office/drawing/2010/main" xmlns="" w="9525">
+                  <a14:hiddenLine xmlns="" xmlns:a14="http://schemas.microsoft.com/office/drawing/2010/main" w="9525">
                     <a:solidFill>
                       <a:srgbClr val="000000"/>
                     </a:solidFill>
@@ -42339,7 +42341,7 @@
               </a:ln>
               <a:extLst>
                 <a:ext uri="{91240B29-F687-4f45-9708-019B960494DF}">
-                  <a14:hiddenLine xmlns:a14="http://schemas.microsoft.com/office/drawing/2010/main" xmlns="" w="9525">
+                  <a14:hiddenLine xmlns="" xmlns:a14="http://schemas.microsoft.com/office/drawing/2010/main" w="9525">
                     <a:solidFill>
                       <a:srgbClr val="000000"/>
                     </a:solidFill>
@@ -42429,7 +42431,7 @@
               </a:ln>
               <a:extLst>
                 <a:ext uri="{91240B29-F687-4f45-9708-019B960494DF}">
-                  <a14:hiddenLine xmlns:a14="http://schemas.microsoft.com/office/drawing/2010/main" xmlns="" w="9525">
+                  <a14:hiddenLine xmlns="" xmlns:a14="http://schemas.microsoft.com/office/drawing/2010/main" w="9525">
                     <a:solidFill>
                       <a:srgbClr val="000000"/>
                     </a:solidFill>
@@ -42494,7 +42496,7 @@
               </a:ln>
               <a:extLst>
                 <a:ext uri="{91240B29-F687-4f45-9708-019B960494DF}">
-                  <a14:hiddenLine xmlns:a14="http://schemas.microsoft.com/office/drawing/2010/main" xmlns="" w="9525">
+                  <a14:hiddenLine xmlns="" xmlns:a14="http://schemas.microsoft.com/office/drawing/2010/main" w="9525">
                     <a:solidFill>
                       <a:srgbClr val="000000"/>
                     </a:solidFill>
@@ -42584,7 +42586,7 @@
               </a:ln>
               <a:extLst>
                 <a:ext uri="{91240B29-F687-4f45-9708-019B960494DF}">
-                  <a14:hiddenLine xmlns:a14="http://schemas.microsoft.com/office/drawing/2010/main" xmlns="" w="9525">
+                  <a14:hiddenLine xmlns="" xmlns:a14="http://schemas.microsoft.com/office/drawing/2010/main" w="9525">
                     <a:solidFill>
                       <a:srgbClr val="000000"/>
                     </a:solidFill>
@@ -42652,7 +42654,7 @@
               </a:ln>
               <a:extLst>
                 <a:ext uri="{91240B29-F687-4f45-9708-019B960494DF}">
-                  <a14:hiddenLine xmlns:a14="http://schemas.microsoft.com/office/drawing/2010/main" xmlns="" w="9525">
+                  <a14:hiddenLine xmlns="" xmlns:a14="http://schemas.microsoft.com/office/drawing/2010/main" w="9525">
                     <a:solidFill>
                       <a:srgbClr val="000000"/>
                     </a:solidFill>
@@ -42742,7 +42744,7 @@
               </a:ln>
               <a:extLst>
                 <a:ext uri="{91240B29-F687-4f45-9708-019B960494DF}">
-                  <a14:hiddenLine xmlns:a14="http://schemas.microsoft.com/office/drawing/2010/main" xmlns="" w="9525">
+                  <a14:hiddenLine xmlns="" xmlns:a14="http://schemas.microsoft.com/office/drawing/2010/main" w="9525">
                     <a:solidFill>
                       <a:srgbClr val="000000"/>
                     </a:solidFill>
@@ -42810,7 +42812,7 @@
               </a:ln>
               <a:extLst>
                 <a:ext uri="{91240B29-F687-4f45-9708-019B960494DF}">
-                  <a14:hiddenLine xmlns:a14="http://schemas.microsoft.com/office/drawing/2010/main" xmlns="" w="9525">
+                  <a14:hiddenLine xmlns="" xmlns:a14="http://schemas.microsoft.com/office/drawing/2010/main" w="9525">
                     <a:solidFill>
                       <a:srgbClr val="000000"/>
                     </a:solidFill>
@@ -42900,7 +42902,7 @@
               </a:ln>
               <a:extLst>
                 <a:ext uri="{91240B29-F687-4f45-9708-019B960494DF}">
-                  <a14:hiddenLine xmlns:a14="http://schemas.microsoft.com/office/drawing/2010/main" xmlns="" w="9525">
+                  <a14:hiddenLine xmlns="" xmlns:a14="http://schemas.microsoft.com/office/drawing/2010/main" w="9525">
                     <a:solidFill>
                       <a:srgbClr val="000000"/>
                     </a:solidFill>
@@ -42934,7 +42936,7 @@
               </a:ln>
               <a:extLst>
                 <a:ext uri="{91240B29-F687-4f45-9708-019B960494DF}">
-                  <a14:hiddenLine xmlns:a14="http://schemas.microsoft.com/office/drawing/2010/main" xmlns="" w="9525">
+                  <a14:hiddenLine xmlns="" xmlns:a14="http://schemas.microsoft.com/office/drawing/2010/main" w="9525">
                     <a:solidFill>
                       <a:srgbClr val="000000"/>
                     </a:solidFill>
@@ -43075,7 +43077,7 @@
             <a:fld id="{48A87A34-81AB-432B-8DAE-1953F412C126}" type="datetimeFigureOut">
               <a:rPr lang="en-US" smtClean="0"/>
               <a:pPr/>
-              <a:t>9/11/2017</a:t>
+              <a:t>9/16/2017</a:t>
             </a:fld>
             <a:endParaRPr lang="en-US" dirty="0"/>
           </a:p>
@@ -47135,10 +47137,47 @@
           <a:p>
             <a:r>
               <a:rPr lang="en-US" dirty="0" smtClean="0"/>
-              <a:t>Operates on binary bits (0 and 1) instead of texts or so</a:t>
+              <a:t>Operates on binary </a:t>
+            </a:r>
+            <a:r>
+              <a:rPr lang="en-US" dirty="0" smtClean="0"/>
+              <a:t>bit sequences </a:t>
+            </a:r>
+            <a:r>
+              <a:rPr lang="en-US" dirty="0" smtClean="0"/>
+              <a:t>(0 and 1) instead of texts or so</a:t>
             </a:r>
           </a:p>
           <a:p>
+            <a:r>
+              <a:rPr lang="en-US" dirty="0" smtClean="0"/>
+              <a:t>Foundation of </a:t>
+            </a:r>
+            <a:r>
+              <a:rPr lang="en-US" dirty="0"/>
+              <a:t>computer and communications </a:t>
+            </a:r>
+            <a:r>
+              <a:rPr lang="en-US" dirty="0" smtClean="0"/>
+              <a:t>security</a:t>
+            </a:r>
+          </a:p>
+          <a:p>
+            <a:r>
+              <a:rPr lang="en-US" dirty="0" smtClean="0"/>
+              <a:t>Relies on publically known mathematical algorithms</a:t>
+            </a:r>
+          </a:p>
+          <a:p>
+            <a:r>
+              <a:rPr lang="en-US" dirty="0" smtClean="0"/>
+              <a:t>Cipher Algorithm is publically known</a:t>
+            </a:r>
+          </a:p>
+          <a:p>
+            <a:pPr marL="0" indent="0">
+              <a:buNone/>
+            </a:pPr>
             <a:endParaRPr lang="en-US" dirty="0" smtClean="0"/>
           </a:p>
         </p:txBody>
@@ -49443,6 +49482,13 @@
         </p:nvPicPr>
         <p:blipFill>
           <a:blip r:embed="rId2">
+            <a:duotone>
+              <a:schemeClr val="bg2">
+                <a:shade val="45000"/>
+                <a:satMod val="135000"/>
+              </a:schemeClr>
+              <a:prstClr val="white"/>
+            </a:duotone>
             <a:extLst>
               <a:ext uri="{28A0092B-C50C-407E-A947-70E740481C1C}">
                 <a14:useLocalDpi xmlns:a14="http://schemas.microsoft.com/office/drawing/2010/main" val="0"/>
@@ -49824,7 +49870,11 @@
           <a:p>
             <a:r>
               <a:rPr lang="en-US" dirty="0" smtClean="0"/>
-              <a:t>AES</a:t>
+              <a:t>AES/</a:t>
+            </a:r>
+            <a:r>
+              <a:rPr lang="en-US" dirty="0" err="1"/>
+              <a:t>Rijndael</a:t>
             </a:r>
             <a:endParaRPr lang="en-US" dirty="0"/>
           </a:p>
@@ -49845,6 +49895,36 @@
           <a:bodyPr/>
           <a:lstStyle/>
           <a:p>
+            <a:r>
+              <a:rPr lang="en-US" dirty="0" smtClean="0"/>
+              <a:t>Block size 128-bits, key length can be </a:t>
+            </a:r>
+            <a:r>
+              <a:rPr lang="en-US" dirty="0"/>
+              <a:t>128, 192 and 256 </a:t>
+            </a:r>
+            <a:r>
+              <a:rPr lang="en-US" dirty="0" smtClean="0"/>
+              <a:t>bits</a:t>
+            </a:r>
+          </a:p>
+          <a:p>
+            <a:r>
+              <a:rPr lang="en-US" dirty="0" smtClean="0"/>
+              <a:t>Based on Substitution-Permutation Network</a:t>
+            </a:r>
+          </a:p>
+          <a:p>
+            <a:r>
+              <a:rPr lang="en-US" dirty="0" smtClean="0"/>
+              <a:t>Faster in both software and hardware</a:t>
+            </a:r>
+          </a:p>
+          <a:p>
+            <a:r>
+              <a:rPr lang="en-US" dirty="0"/>
+              <a:t>At present, there is no known practical attack that would allow someone without knowledge of the key to read data encrypted by AES when correctly implemented</a:t>
+            </a:r>
             <a:endParaRPr lang="en-US" dirty="0"/>
           </a:p>
         </p:txBody>
@@ -49870,6 +49950,95 @@
 </file>
 
 <file path=ppt/slides/slide38.xml><?xml version="1.0" encoding="utf-8"?>
+<p:sld xmlns:a="http://schemas.openxmlformats.org/drawingml/2006/main" xmlns:r="http://schemas.openxmlformats.org/officeDocument/2006/relationships" xmlns:p="http://schemas.openxmlformats.org/presentationml/2006/main">
+  <p:cSld>
+    <p:spTree>
+      <p:nvGrpSpPr>
+        <p:cNvPr id="1" name=""/>
+        <p:cNvGrpSpPr/>
+        <p:nvPr/>
+      </p:nvGrpSpPr>
+      <p:grpSpPr>
+        <a:xfrm>
+          <a:off x="0" y="0"/>
+          <a:ext cx="0" cy="0"/>
+          <a:chOff x="0" y="0"/>
+          <a:chExt cx="0" cy="0"/>
+        </a:xfrm>
+      </p:grpSpPr>
+      <p:pic>
+        <p:nvPicPr>
+          <p:cNvPr id="5" name="Content Placeholder 4"/>
+          <p:cNvPicPr>
+            <a:picLocks noGrp="1" noChangeAspect="1"/>
+          </p:cNvPicPr>
+          <p:nvPr>
+            <p:ph idx="1"/>
+          </p:nvPr>
+        </p:nvPicPr>
+        <p:blipFill>
+          <a:blip r:embed="rId2">
+            <a:extLst>
+              <a:ext uri="{28A0092B-C50C-407E-A947-70E740481C1C}">
+                <a14:useLocalDpi xmlns:a14="http://schemas.microsoft.com/office/drawing/2010/main" val="0"/>
+              </a:ext>
+            </a:extLst>
+          </a:blip>
+          <a:stretch>
+            <a:fillRect/>
+          </a:stretch>
+        </p:blipFill>
+        <p:spPr>
+          <a:xfrm>
+            <a:off x="2095625" y="1107680"/>
+            <a:ext cx="8150783" cy="5119356"/>
+          </a:xfrm>
+        </p:spPr>
+      </p:pic>
+      <p:sp>
+        <p:nvSpPr>
+          <p:cNvPr id="6" name="TextBox 5"/>
+          <p:cNvSpPr txBox="1"/>
+          <p:nvPr/>
+        </p:nvSpPr>
+        <p:spPr>
+          <a:xfrm>
+            <a:off x="4661628" y="738348"/>
+            <a:ext cx="3018775" cy="369332"/>
+          </a:xfrm>
+          <a:prstGeom prst="rect">
+            <a:avLst/>
+          </a:prstGeom>
+          <a:noFill/>
+        </p:spPr>
+        <p:txBody>
+          <a:bodyPr wrap="none" rtlCol="0">
+            <a:spAutoFit/>
+          </a:bodyPr>
+          <a:lstStyle/>
+          <a:p>
+            <a:r>
+              <a:rPr lang="en-US" dirty="0" smtClean="0"/>
+              <a:t>AES Encryption and Decryption</a:t>
+            </a:r>
+            <a:endParaRPr lang="en-US" dirty="0"/>
+          </a:p>
+        </p:txBody>
+      </p:sp>
+    </p:spTree>
+    <p:extLst>
+      <p:ext uri="{BB962C8B-B14F-4D97-AF65-F5344CB8AC3E}">
+        <p14:creationId xmlns:p14="http://schemas.microsoft.com/office/powerpoint/2010/main" val="4155553073"/>
+      </p:ext>
+    </p:extLst>
+  </p:cSld>
+  <p:clrMapOvr>
+    <a:masterClrMapping/>
+  </p:clrMapOvr>
+</p:sld>
+</file>
+
+<file path=ppt/slides/slide39.xml><?xml version="1.0" encoding="utf-8"?>
 <p:sld xmlns:a="http://schemas.openxmlformats.org/drawingml/2006/main" xmlns:r="http://schemas.openxmlformats.org/officeDocument/2006/relationships" xmlns:p="http://schemas.openxmlformats.org/presentationml/2006/main">
   <p:cSld>
     <p:spTree>
@@ -50101,6 +50270,65 @@
       </p:par>
     </p:tnLst>
   </p:timing>
+</p:sld>
+</file>
+
+<file path=ppt/slides/slide40.xml><?xml version="1.0" encoding="utf-8"?>
+<p:sld xmlns:a="http://schemas.openxmlformats.org/drawingml/2006/main" xmlns:r="http://schemas.openxmlformats.org/officeDocument/2006/relationships" xmlns:p="http://schemas.openxmlformats.org/presentationml/2006/main">
+  <p:cSld>
+    <p:spTree>
+      <p:nvGrpSpPr>
+        <p:cNvPr id="1" name=""/>
+        <p:cNvGrpSpPr/>
+        <p:nvPr/>
+      </p:nvGrpSpPr>
+      <p:grpSpPr>
+        <a:xfrm>
+          <a:off x="0" y="0"/>
+          <a:ext cx="0" cy="0"/>
+          <a:chOff x="0" y="0"/>
+          <a:chExt cx="0" cy="0"/>
+        </a:xfrm>
+      </p:grpSpPr>
+      <p:sp>
+        <p:nvSpPr>
+          <p:cNvPr id="2" name="Title 1"/>
+          <p:cNvSpPr>
+            <a:spLocks noGrp="1"/>
+          </p:cNvSpPr>
+          <p:nvPr>
+            <p:ph type="title"/>
+          </p:nvPr>
+        </p:nvSpPr>
+        <p:spPr>
+          <a:xfrm>
+            <a:off x="953405" y="2609688"/>
+            <a:ext cx="9905998" cy="1478570"/>
+          </a:xfrm>
+        </p:spPr>
+        <p:txBody>
+          <a:bodyPr/>
+          <a:lstStyle/>
+          <a:p>
+            <a:pPr algn="ctr"/>
+            <a:r>
+              <a:rPr lang="en-US" dirty="0" smtClean="0"/>
+              <a:t>Thank You</a:t>
+            </a:r>
+            <a:endParaRPr lang="en-US" dirty="0"/>
+          </a:p>
+        </p:txBody>
+      </p:sp>
+    </p:spTree>
+    <p:extLst>
+      <p:ext uri="{BB962C8B-B14F-4D97-AF65-F5344CB8AC3E}">
+        <p14:creationId xmlns:p14="http://schemas.microsoft.com/office/powerpoint/2010/main" val="3539134709"/>
+      </p:ext>
+    </p:extLst>
+  </p:cSld>
+  <p:clrMapOvr>
+    <a:masterClrMapping/>
+  </p:clrMapOvr>
 </p:sld>
 </file>
 

</xml_diff>